<commit_message>
Added diagrams to COntinuous Delivery. Added the rest of Tips and Tricks code.
</commit_message>
<xml_diff>
--- a/ContinuousDelivery/Continuous Delivery.pptx
+++ b/ContinuousDelivery/Continuous Delivery.pptx
@@ -908,31 +908,7 @@
                 <a:ea typeface="+mn-ea"/>
                 <a:cs typeface="+mn-cs"/>
               </a:rPr>
-              <a:t>Every Check-in (like </a:t>
-            </a:r>
-            <a:r>
-              <a:rPr lang="en-US" sz="1200" b="0" i="0" u="none" strike="noStrike" kern="1200" dirty="0" err="1" smtClean="0">
-                <a:solidFill>
-                  <a:schemeClr val="tx1"/>
-                </a:solidFill>
-                <a:effectLst/>
-                <a:latin typeface="+mn-lt"/>
-                <a:ea typeface="+mn-ea"/>
-                <a:cs typeface="+mn-cs"/>
-              </a:rPr>
-              <a:t>COntinuous</a:t>
-            </a:r>
-            <a:r>
-              <a:rPr lang="en-US" sz="1200" b="0" i="0" u="none" strike="noStrike" kern="1200" dirty="0" smtClean="0">
-                <a:solidFill>
-                  <a:schemeClr val="tx1"/>
-                </a:solidFill>
-                <a:effectLst/>
-                <a:latin typeface="+mn-lt"/>
-                <a:ea typeface="+mn-ea"/>
-                <a:cs typeface="+mn-cs"/>
-              </a:rPr>
-              <a:t> Integration)</a:t>
+              <a:t>Every Check-in (like Continuous Integration)</a:t>
             </a:r>
           </a:p>
           <a:p>
@@ -1223,6 +1199,98 @@
 </file>
 
 <file path=ppt/notesSlides/notesSlide8.xml><?xml version="1.0" encoding="utf-8"?>
+<p:notes xmlns:a="http://schemas.openxmlformats.org/drawingml/2006/main" xmlns:r="http://schemas.openxmlformats.org/officeDocument/2006/relationships" xmlns:p="http://schemas.openxmlformats.org/presentationml/2006/main">
+  <p:cSld>
+    <p:spTree>
+      <p:nvGrpSpPr>
+        <p:cNvPr id="1" name=""/>
+        <p:cNvGrpSpPr/>
+        <p:nvPr/>
+      </p:nvGrpSpPr>
+      <p:grpSpPr>
+        <a:xfrm>
+          <a:off x="0" y="0"/>
+          <a:ext cx="0" cy="0"/>
+          <a:chOff x="0" y="0"/>
+          <a:chExt cx="0" cy="0"/>
+        </a:xfrm>
+      </p:grpSpPr>
+      <p:sp>
+        <p:nvSpPr>
+          <p:cNvPr id="2" name="Slide Image Placeholder 1"/>
+          <p:cNvSpPr>
+            <a:spLocks noGrp="1" noRot="1" noChangeAspect="1"/>
+          </p:cNvSpPr>
+          <p:nvPr>
+            <p:ph type="sldImg"/>
+          </p:nvPr>
+        </p:nvSpPr>
+        <p:spPr/>
+      </p:sp>
+      <p:sp>
+        <p:nvSpPr>
+          <p:cNvPr id="3" name="Notes Placeholder 2"/>
+          <p:cNvSpPr>
+            <a:spLocks noGrp="1"/>
+          </p:cNvSpPr>
+          <p:nvPr>
+            <p:ph type="body" idx="1"/>
+          </p:nvPr>
+        </p:nvSpPr>
+        <p:spPr/>
+        <p:txBody>
+          <a:bodyPr/>
+          <a:lstStyle/>
+          <a:p>
+            <a:r>
+              <a:rPr lang="en-US" dirty="0" smtClean="0"/>
+              <a:t>By Brian </a:t>
+            </a:r>
+            <a:r>
+              <a:rPr lang="en-US" dirty="0" err="1" smtClean="0"/>
+              <a:t>Marick</a:t>
+            </a:r>
+            <a:endParaRPr lang="en-US" dirty="0"/>
+          </a:p>
+        </p:txBody>
+      </p:sp>
+      <p:sp>
+        <p:nvSpPr>
+          <p:cNvPr id="4" name="Slide Number Placeholder 3"/>
+          <p:cNvSpPr>
+            <a:spLocks noGrp="1"/>
+          </p:cNvSpPr>
+          <p:nvPr>
+            <p:ph type="sldNum" sz="quarter" idx="10"/>
+          </p:nvPr>
+        </p:nvSpPr>
+        <p:spPr/>
+        <p:txBody>
+          <a:bodyPr/>
+          <a:lstStyle/>
+          <a:p>
+            <a:fld id="{7BEECE84-249F-4171-B47D-FD2664747E9B}" type="slidenum">
+              <a:rPr lang="en-US" smtClean="0"/>
+              <a:t>18</a:t>
+            </a:fld>
+            <a:endParaRPr lang="en-US"/>
+          </a:p>
+        </p:txBody>
+      </p:sp>
+    </p:spTree>
+    <p:extLst>
+      <p:ext uri="{BB962C8B-B14F-4D97-AF65-F5344CB8AC3E}">
+        <p14:creationId xmlns:p14="http://schemas.microsoft.com/office/powerpoint/2010/main" val="1670381376"/>
+      </p:ext>
+    </p:extLst>
+  </p:cSld>
+  <p:clrMapOvr>
+    <a:masterClrMapping/>
+  </p:clrMapOvr>
+</p:notes>
+</file>
+
+<file path=ppt/notesSlides/notesSlide9.xml><?xml version="1.0" encoding="utf-8"?>
 <p:notes xmlns:a="http://schemas.openxmlformats.org/drawingml/2006/main" xmlns:r="http://schemas.openxmlformats.org/officeDocument/2006/relationships" xmlns:p="http://schemas.openxmlformats.org/presentationml/2006/main">
   <p:cSld>
     <p:spTree>
@@ -4938,29 +5006,35 @@
           </a:p>
         </p:txBody>
       </p:sp>
-      <p:sp>
-        <p:nvSpPr>
-          <p:cNvPr id="3" name="Content Placeholder 2"/>
-          <p:cNvSpPr>
-            <a:spLocks noGrp="1"/>
-          </p:cNvSpPr>
+      <p:pic>
+        <p:nvPicPr>
+          <p:cNvPr id="4" name="Content Placeholder 3"/>
+          <p:cNvPicPr>
+            <a:picLocks noGrp="1" noChangeAspect="1"/>
+          </p:cNvPicPr>
           <p:nvPr>
             <p:ph idx="1"/>
           </p:nvPr>
-        </p:nvSpPr>
-        <p:spPr/>
-        <p:txBody>
-          <a:bodyPr/>
-          <a:lstStyle/>
-          <a:p>
-            <a:r>
-              <a:rPr lang="en-US" dirty="0" smtClean="0"/>
-              <a:t>(Diagram)</a:t>
-            </a:r>
-            <a:endParaRPr lang="en-US" dirty="0"/>
-          </a:p>
-        </p:txBody>
-      </p:sp>
+        </p:nvPicPr>
+        <p:blipFill>
+          <a:blip r:embed="rId3">
+            <a:extLst>
+              <a:ext uri="{28A0092B-C50C-407E-A947-70E740481C1C}">
+                <a14:useLocalDpi xmlns:a14="http://schemas.microsoft.com/office/drawing/2010/main" val="0"/>
+              </a:ext>
+            </a:extLst>
+          </a:blip>
+          <a:stretch>
+            <a:fillRect/>
+          </a:stretch>
+        </p:blipFill>
+        <p:spPr>
+          <a:xfrm>
+            <a:off x="1167551" y="1600200"/>
+            <a:ext cx="6808897" cy="4876800"/>
+          </a:xfrm>
+        </p:spPr>
+      </p:pic>
     </p:spTree>
     <p:extLst>
       <p:ext uri="{BB962C8B-B14F-4D97-AF65-F5344CB8AC3E}">
@@ -5623,32 +5697,64 @@
           </a:p>
         </p:txBody>
       </p:sp>
-      <p:sp>
-        <p:nvSpPr>
-          <p:cNvPr id="3" name="Content Placeholder 2"/>
-          <p:cNvSpPr>
-            <a:spLocks noGrp="1"/>
-          </p:cNvSpPr>
+      <p:pic>
+        <p:nvPicPr>
+          <p:cNvPr id="4" name="Content Placeholder 3"/>
+          <p:cNvPicPr>
+            <a:picLocks noGrp="1" noChangeAspect="1"/>
+          </p:cNvPicPr>
           <p:nvPr>
             <p:ph idx="1"/>
           </p:nvPr>
-        </p:nvSpPr>
-        <p:spPr/>
-        <p:txBody>
-          <a:bodyPr/>
+        </p:nvPicPr>
+        <p:blipFill>
+          <a:blip r:embed="rId3">
+            <a:extLst>
+              <a:ext uri="{28A0092B-C50C-407E-A947-70E740481C1C}">
+                <a14:useLocalDpi xmlns:a14="http://schemas.microsoft.com/office/drawing/2010/main" val="0"/>
+              </a:ext>
+            </a:extLst>
+          </a:blip>
+          <a:stretch>
+            <a:fillRect/>
+          </a:stretch>
+        </p:blipFill>
+        <p:spPr>
+          <a:xfrm>
+            <a:off x="838200" y="1295400"/>
+            <a:ext cx="6353175" cy="4648200"/>
+          </a:xfrm>
+        </p:spPr>
+      </p:pic>
+      <p:sp>
+        <p:nvSpPr>
+          <p:cNvPr id="5" name="TextBox 4"/>
+          <p:cNvSpPr txBox="1"/>
+          <p:nvPr/>
+        </p:nvSpPr>
+        <p:spPr>
+          <a:xfrm>
+            <a:off x="914400" y="6014966"/>
+            <a:ext cx="2069797" cy="369332"/>
+          </a:xfrm>
+          <a:prstGeom prst="rect">
+            <a:avLst/>
+          </a:prstGeom>
+          <a:noFill/>
+        </p:spPr>
+        <p:txBody>
+          <a:bodyPr wrap="none" rtlCol="0">
+            <a:spAutoFit/>
+          </a:bodyPr>
           <a:lstStyle/>
           <a:p>
             <a:r>
               <a:rPr lang="en-US" dirty="0" smtClean="0"/>
-              <a:t>(Diagram by Brian </a:t>
+              <a:t>From Brian </a:t>
             </a:r>
             <a:r>
               <a:rPr lang="en-US" dirty="0" err="1" smtClean="0"/>
               <a:t>Marick</a:t>
-            </a:r>
-            <a:r>
-              <a:rPr lang="en-US" dirty="0" smtClean="0"/>
-              <a:t>)</a:t>
             </a:r>
             <a:endParaRPr lang="en-US" dirty="0"/>
           </a:p>
@@ -5703,40 +5809,42 @@
           <a:p>
             <a:pPr fontAlgn="base"/>
             <a:r>
-              <a:rPr lang="en-US" dirty="0"/>
-              <a:t>Canary </a:t>
-            </a:r>
-            <a:r>
               <a:rPr lang="en-US" dirty="0" smtClean="0"/>
-              <a:t>Releasing</a:t>
-            </a:r>
-            <a:endParaRPr lang="en-US" dirty="0"/>
-          </a:p>
-        </p:txBody>
-      </p:sp>
-      <p:sp>
-        <p:nvSpPr>
-          <p:cNvPr id="3" name="Content Placeholder 2"/>
-          <p:cNvSpPr>
-            <a:spLocks noGrp="1"/>
-          </p:cNvSpPr>
+              <a:t>Canary Releasing</a:t>
+            </a:r>
+            <a:endParaRPr lang="en-US" dirty="0"/>
+          </a:p>
+        </p:txBody>
+      </p:sp>
+      <p:pic>
+        <p:nvPicPr>
+          <p:cNvPr id="5" name="Content Placeholder 4"/>
+          <p:cNvPicPr>
+            <a:picLocks noGrp="1" noChangeAspect="1"/>
+          </p:cNvPicPr>
           <p:nvPr>
             <p:ph idx="1"/>
           </p:nvPr>
-        </p:nvSpPr>
-        <p:spPr/>
-        <p:txBody>
-          <a:bodyPr/>
-          <a:lstStyle/>
-          <a:p>
-            <a:r>
-              <a:rPr lang="en-US" dirty="0" smtClean="0"/>
-              <a:t>(Diagram)</a:t>
-            </a:r>
-            <a:endParaRPr lang="en-US" dirty="0"/>
-          </a:p>
-        </p:txBody>
-      </p:sp>
+        </p:nvPicPr>
+        <p:blipFill>
+          <a:blip r:embed="rId2">
+            <a:extLst>
+              <a:ext uri="{28A0092B-C50C-407E-A947-70E740481C1C}">
+                <a14:useLocalDpi xmlns:a14="http://schemas.microsoft.com/office/drawing/2010/main" val="0"/>
+              </a:ext>
+            </a:extLst>
+          </a:blip>
+          <a:stretch>
+            <a:fillRect/>
+          </a:stretch>
+        </p:blipFill>
+        <p:spPr>
+          <a:xfrm>
+            <a:off x="1066800" y="1524000"/>
+            <a:ext cx="6502400" cy="4876800"/>
+          </a:xfrm>
+        </p:spPr>
+      </p:pic>
     </p:spTree>
     <p:extLst>
       <p:ext uri="{BB962C8B-B14F-4D97-AF65-F5344CB8AC3E}">
@@ -6617,29 +6725,35 @@
           </a:p>
         </p:txBody>
       </p:sp>
-      <p:sp>
-        <p:nvSpPr>
-          <p:cNvPr id="3" name="Content Placeholder 2"/>
-          <p:cNvSpPr>
-            <a:spLocks noGrp="1"/>
-          </p:cNvSpPr>
+      <p:pic>
+        <p:nvPicPr>
+          <p:cNvPr id="4" name="Content Placeholder 3"/>
+          <p:cNvPicPr>
+            <a:picLocks noGrp="1" noChangeAspect="1"/>
+          </p:cNvPicPr>
           <p:nvPr>
             <p:ph idx="1"/>
           </p:nvPr>
-        </p:nvSpPr>
-        <p:spPr/>
-        <p:txBody>
-          <a:bodyPr/>
-          <a:lstStyle/>
-          <a:p>
-            <a:r>
-              <a:rPr lang="en-US" dirty="0" smtClean="0"/>
-              <a:t>(Graph)</a:t>
-            </a:r>
-            <a:endParaRPr lang="en-US" dirty="0"/>
-          </a:p>
-        </p:txBody>
-      </p:sp>
+        </p:nvPicPr>
+        <p:blipFill>
+          <a:blip r:embed="rId3">
+            <a:extLst>
+              <a:ext uri="{28A0092B-C50C-407E-A947-70E740481C1C}">
+                <a14:useLocalDpi xmlns:a14="http://schemas.microsoft.com/office/drawing/2010/main" val="0"/>
+              </a:ext>
+            </a:extLst>
+          </a:blip>
+          <a:stretch>
+            <a:fillRect/>
+          </a:stretch>
+        </p:blipFill>
+        <p:spPr>
+          <a:xfrm>
+            <a:off x="609600" y="1447800"/>
+            <a:ext cx="6489268" cy="4872037"/>
+          </a:xfrm>
+        </p:spPr>
+      </p:pic>
     </p:spTree>
     <p:extLst>
       <p:ext uri="{BB962C8B-B14F-4D97-AF65-F5344CB8AC3E}">

</xml_diff>